<commit_message>
More stuff for lecture 03
</commit_message>
<xml_diff>
--- a/Slides/Lecture03 - Lambdas and LINQ.pptx
+++ b/Slides/Lecture03 - Lambdas and LINQ.pptx
@@ -5,20 +5,22 @@
     <p:sldMasterId id="2147484082" r:id="rId4"/>
   </p:sldMasterIdLst>
   <p:notesMasterIdLst>
-    <p:notesMasterId r:id="rId13"/>
+    <p:notesMasterId r:id="rId15"/>
   </p:notesMasterIdLst>
   <p:handoutMasterIdLst>
-    <p:handoutMasterId r:id="rId14"/>
+    <p:handoutMasterId r:id="rId16"/>
   </p:handoutMasterIdLst>
   <p:sldIdLst>
     <p:sldId id="880" r:id="rId5"/>
     <p:sldId id="1074" r:id="rId6"/>
-    <p:sldId id="1075" r:id="rId7"/>
-    <p:sldId id="1076" r:id="rId8"/>
-    <p:sldId id="1077" r:id="rId9"/>
-    <p:sldId id="1078" r:id="rId10"/>
-    <p:sldId id="1079" r:id="rId11"/>
-    <p:sldId id="1080" r:id="rId12"/>
+    <p:sldId id="1081" r:id="rId7"/>
+    <p:sldId id="1082" r:id="rId8"/>
+    <p:sldId id="1075" r:id="rId9"/>
+    <p:sldId id="1076" r:id="rId10"/>
+    <p:sldId id="1077" r:id="rId11"/>
+    <p:sldId id="1078" r:id="rId12"/>
+    <p:sldId id="1079" r:id="rId13"/>
+    <p:sldId id="1080" r:id="rId14"/>
   </p:sldIdLst>
   <p:sldSz cx="9326563" cy="6994525"/>
   <p:notesSz cx="6858000" cy="9144000"/>
@@ -124,6 +126,8 @@
           <p14:sldIdLst>
             <p14:sldId id="880"/>
             <p14:sldId id="1074"/>
+            <p14:sldId id="1081"/>
+            <p14:sldId id="1082"/>
             <p14:sldId id="1075"/>
             <p14:sldId id="1076"/>
             <p14:sldId id="1077"/>
@@ -344,7 +348,7 @@
               <a:rPr lang="en-US" smtClean="0">
                 <a:latin typeface="Segoe UI" pitchFamily="34" charset="0"/>
               </a:rPr>
-              <a:t>9/2/2018</a:t>
+              <a:t>9/13/2018</a:t>
             </a:fld>
             <a:endParaRPr lang="en-US" dirty="0">
               <a:latin typeface="Segoe UI" pitchFamily="34" charset="0"/>
@@ -667,7 +671,7 @@
             <a:fld id="{D51B1278-D92B-4AF3-A9C1-71DD298190CE}" type="datetimeFigureOut">
               <a:rPr lang="en-US" smtClean="0"/>
               <a:pPr/>
-              <a:t>9/2/2018</a:t>
+              <a:t>9/13/2018</a:t>
             </a:fld>
             <a:endParaRPr lang="en-US" dirty="0"/>
           </a:p>
@@ -4647,6 +4651,118 @@
 </p:sld>
 </file>
 
+<file path=ppt/slides/slide10.xml><?xml version="1.0" encoding="utf-8"?>
+<p:sld xmlns:a="http://schemas.openxmlformats.org/drawingml/2006/main" xmlns:r="http://schemas.openxmlformats.org/officeDocument/2006/relationships" xmlns:p="http://schemas.openxmlformats.org/presentationml/2006/main">
+  <p:cSld>
+    <p:bg>
+      <p:bgPr>
+        <a:solidFill>
+          <a:srgbClr val="00188F"/>
+        </a:solidFill>
+        <a:effectLst/>
+      </p:bgPr>
+    </p:bg>
+    <p:spTree>
+      <p:nvGrpSpPr>
+        <p:cNvPr id="1" name=""/>
+        <p:cNvGrpSpPr/>
+        <p:nvPr/>
+      </p:nvGrpSpPr>
+      <p:grpSpPr>
+        <a:xfrm>
+          <a:off x="0" y="0"/>
+          <a:ext cx="0" cy="0"/>
+          <a:chOff x="0" y="0"/>
+          <a:chExt cx="0" cy="0"/>
+        </a:xfrm>
+      </p:grpSpPr>
+      <p:sp>
+        <p:nvSpPr>
+          <p:cNvPr id="2" name="Title 1">
+            <a:extLst>
+              <a:ext uri="{FF2B5EF4-FFF2-40B4-BE49-F238E27FC236}">
+                <a16:creationId xmlns:a16="http://schemas.microsoft.com/office/drawing/2014/main" id="{DACBDE14-6E24-4435-99D0-DCA6EBAA14E8}"/>
+              </a:ext>
+            </a:extLst>
+          </p:cNvPr>
+          <p:cNvSpPr>
+            <a:spLocks noGrp="1"/>
+          </p:cNvSpPr>
+          <p:nvPr>
+            <p:ph type="title"/>
+          </p:nvPr>
+        </p:nvSpPr>
+        <p:spPr/>
+        <p:txBody>
+          <a:bodyPr/>
+          <a:lstStyle/>
+          <a:p>
+            <a:r>
+              <a:rPr lang="da-DK" dirty="0">
+                <a:solidFill>
+                  <a:schemeClr val="bg1"/>
+                </a:solidFill>
+              </a:rPr>
+              <a:t>Linq</a:t>
+            </a:r>
+            <a:endParaRPr lang="en-DK" dirty="0">
+              <a:solidFill>
+                <a:schemeClr val="bg1"/>
+              </a:solidFill>
+            </a:endParaRPr>
+          </a:p>
+        </p:txBody>
+      </p:sp>
+      <p:sp>
+        <p:nvSpPr>
+          <p:cNvPr id="3" name="Text Placeholder 2">
+            <a:extLst>
+              <a:ext uri="{FF2B5EF4-FFF2-40B4-BE49-F238E27FC236}">
+                <a16:creationId xmlns:a16="http://schemas.microsoft.com/office/drawing/2014/main" id="{9F0CF441-10E2-4402-8E81-4B2DA9307069}"/>
+              </a:ext>
+            </a:extLst>
+          </p:cNvPr>
+          <p:cNvSpPr>
+            <a:spLocks noGrp="1"/>
+          </p:cNvSpPr>
+          <p:nvPr>
+            <p:ph type="body" sz="quarter" idx="10"/>
+          </p:nvPr>
+        </p:nvSpPr>
+        <p:spPr>
+          <a:xfrm>
+            <a:off x="274209" y="1212850"/>
+            <a:ext cx="8778240" cy="683264"/>
+          </a:xfrm>
+        </p:spPr>
+        <p:txBody>
+          <a:bodyPr/>
+          <a:lstStyle/>
+          <a:p>
+            <a:endParaRPr lang="en-DK">
+              <a:solidFill>
+                <a:schemeClr val="bg1"/>
+              </a:solidFill>
+            </a:endParaRPr>
+          </a:p>
+        </p:txBody>
+      </p:sp>
+    </p:spTree>
+    <p:extLst>
+      <p:ext uri="{BB962C8B-B14F-4D97-AF65-F5344CB8AC3E}">
+        <p14:creationId xmlns:p14="http://schemas.microsoft.com/office/powerpoint/2010/main" val="1654522918"/>
+      </p:ext>
+    </p:extLst>
+  </p:cSld>
+  <p:clrMapOvr>
+    <a:masterClrMapping/>
+  </p:clrMapOvr>
+  <p:transition>
+    <p:fade/>
+  </p:transition>
+</p:sld>
+</file>
+
 <file path=ppt/slides/slide2.xml><?xml version="1.0" encoding="utf-8"?>
 <p:sld xmlns:a="http://schemas.openxmlformats.org/drawingml/2006/main" xmlns:r="http://schemas.openxmlformats.org/officeDocument/2006/relationships" xmlns:p="http://schemas.openxmlformats.org/presentationml/2006/main">
   <p:cSld>
@@ -4845,7 +4961,7 @@
               </a:spcAft>
             </a:pPr>
             <a:r>
-              <a:rPr lang="da-DK" sz="4400" dirty="0" err="1">
+              <a:rPr lang="da-DK" sz="4400" dirty="0">
                 <a:gradFill>
                   <a:gsLst>
                     <a:gs pos="0">
@@ -4860,23 +4976,8 @@
                 <a:ea typeface="Segoe UI" pitchFamily="34" charset="0"/>
                 <a:cs typeface="Segoe UI" pitchFamily="34" charset="0"/>
               </a:rPr>
-              <a:t>Polymorphism</a:t>
-            </a:r>
-            <a:endParaRPr lang="da-DK" sz="4400" dirty="0">
-              <a:gradFill>
-                <a:gsLst>
-                  <a:gs pos="0">
-                    <a:srgbClr val="FFFFFF"/>
-                  </a:gs>
-                  <a:gs pos="100000">
-                    <a:srgbClr val="FFFFFF"/>
-                  </a:gs>
-                </a:gsLst>
-                <a:lin ang="5400000" scaled="0"/>
-              </a:gradFill>
-              <a:ea typeface="Segoe UI" pitchFamily="34" charset="0"/>
-              <a:cs typeface="Segoe UI" pitchFamily="34" charset="0"/>
-            </a:endParaRPr>
+              <a:t>Enumerations</a:t>
+            </a:r>
           </a:p>
         </p:txBody>
       </p:sp>
@@ -4906,6 +5007,645 @@
 </file>
 
 <file path=ppt/slides/slide3.xml><?xml version="1.0" encoding="utf-8"?>
+<p:sld xmlns:a="http://schemas.openxmlformats.org/drawingml/2006/main" xmlns:r="http://schemas.openxmlformats.org/officeDocument/2006/relationships" xmlns:p="http://schemas.openxmlformats.org/presentationml/2006/main">
+  <p:cSld>
+    <p:bg>
+      <p:bgPr>
+        <a:solidFill>
+          <a:schemeClr val="bg1"/>
+        </a:solidFill>
+        <a:effectLst/>
+      </p:bgPr>
+    </p:bg>
+    <p:spTree>
+      <p:nvGrpSpPr>
+        <p:cNvPr id="1" name=""/>
+        <p:cNvGrpSpPr/>
+        <p:nvPr/>
+      </p:nvGrpSpPr>
+      <p:grpSpPr>
+        <a:xfrm>
+          <a:off x="0" y="0"/>
+          <a:ext cx="0" cy="0"/>
+          <a:chOff x="0" y="0"/>
+          <a:chExt cx="0" cy="0"/>
+        </a:xfrm>
+      </p:grpSpPr>
+      <p:sp>
+        <p:nvSpPr>
+          <p:cNvPr id="2" name="Title 1">
+            <a:extLst>
+              <a:ext uri="{FF2B5EF4-FFF2-40B4-BE49-F238E27FC236}">
+                <a16:creationId xmlns:a16="http://schemas.microsoft.com/office/drawing/2014/main" id="{EF9F1B07-DC1C-428C-AAB6-7A27C12BC159}"/>
+              </a:ext>
+            </a:extLst>
+          </p:cNvPr>
+          <p:cNvSpPr>
+            <a:spLocks noGrp="1"/>
+          </p:cNvSpPr>
+          <p:nvPr>
+            <p:ph type="title"/>
+          </p:nvPr>
+        </p:nvSpPr>
+        <p:spPr/>
+        <p:txBody>
+          <a:bodyPr/>
+          <a:lstStyle/>
+          <a:p>
+            <a:r>
+              <a:rPr lang="en-US" dirty="0">
+                <a:solidFill>
+                  <a:schemeClr val="tx1"/>
+                </a:solidFill>
+              </a:rPr>
+              <a:t>Enumerations 1/2</a:t>
+            </a:r>
+            <a:endParaRPr lang="en-DK" dirty="0">
+              <a:solidFill>
+                <a:schemeClr val="tx1"/>
+              </a:solidFill>
+            </a:endParaRPr>
+          </a:p>
+        </p:txBody>
+      </p:sp>
+      <p:sp>
+        <p:nvSpPr>
+          <p:cNvPr id="6" name="Rectangle 5">
+            <a:extLst>
+              <a:ext uri="{FF2B5EF4-FFF2-40B4-BE49-F238E27FC236}">
+                <a16:creationId xmlns:a16="http://schemas.microsoft.com/office/drawing/2014/main" id="{335D5E5F-551C-40DA-ADD9-14D038665356}"/>
+              </a:ext>
+            </a:extLst>
+          </p:cNvPr>
+          <p:cNvSpPr/>
+          <p:nvPr/>
+        </p:nvSpPr>
+        <p:spPr>
+          <a:xfrm>
+            <a:off x="822843" y="2125677"/>
+            <a:ext cx="7679290" cy="3046988"/>
+          </a:xfrm>
+          <a:prstGeom prst="rect">
+            <a:avLst/>
+          </a:prstGeom>
+        </p:spPr>
+        <p:txBody>
+          <a:bodyPr wrap="square">
+            <a:spAutoFit/>
+          </a:bodyPr>
+          <a:lstStyle/>
+          <a:p>
+            <a:r>
+              <a:rPr lang="da-DK" sz="3200" dirty="0">
+                <a:solidFill>
+                  <a:srgbClr val="000000"/>
+                </a:solidFill>
+                <a:latin typeface="Consolas" panose="020B0609020204030204" pitchFamily="49" charset="0"/>
+              </a:rPr>
+              <a:t> </a:t>
+            </a:r>
+            <a:r>
+              <a:rPr lang="da-DK" sz="3200" dirty="0">
+                <a:solidFill>
+                  <a:srgbClr val="0000FF"/>
+                </a:solidFill>
+                <a:latin typeface="Consolas" panose="020B0609020204030204" pitchFamily="49" charset="0"/>
+              </a:rPr>
+              <a:t>public</a:t>
+            </a:r>
+            <a:r>
+              <a:rPr lang="da-DK" sz="3200" dirty="0">
+                <a:solidFill>
+                  <a:srgbClr val="000000"/>
+                </a:solidFill>
+                <a:latin typeface="Consolas" panose="020B0609020204030204" pitchFamily="49" charset="0"/>
+              </a:rPr>
+              <a:t> </a:t>
+            </a:r>
+            <a:r>
+              <a:rPr lang="da-DK" sz="3200" dirty="0">
+                <a:solidFill>
+                  <a:srgbClr val="0000FF"/>
+                </a:solidFill>
+                <a:latin typeface="Consolas" panose="020B0609020204030204" pitchFamily="49" charset="0"/>
+              </a:rPr>
+              <a:t>enum</a:t>
+            </a:r>
+            <a:r>
+              <a:rPr lang="da-DK" sz="3200" dirty="0">
+                <a:solidFill>
+                  <a:srgbClr val="000000"/>
+                </a:solidFill>
+                <a:latin typeface="Consolas" panose="020B0609020204030204" pitchFamily="49" charset="0"/>
+              </a:rPr>
+              <a:t> </a:t>
+            </a:r>
+            <a:r>
+              <a:rPr lang="da-DK" sz="3200" dirty="0">
+                <a:solidFill>
+                  <a:srgbClr val="2B91AF"/>
+                </a:solidFill>
+                <a:latin typeface="Consolas" panose="020B0609020204030204" pitchFamily="49" charset="0"/>
+              </a:rPr>
+              <a:t>TrafficLightColor</a:t>
+            </a:r>
+            <a:endParaRPr lang="da-DK" sz="3200" dirty="0">
+              <a:solidFill>
+                <a:srgbClr val="000000"/>
+              </a:solidFill>
+              <a:latin typeface="Consolas" panose="020B0609020204030204" pitchFamily="49" charset="0"/>
+            </a:endParaRPr>
+          </a:p>
+          <a:p>
+            <a:r>
+              <a:rPr lang="en-DK" sz="3200" dirty="0">
+                <a:solidFill>
+                  <a:srgbClr val="000000"/>
+                </a:solidFill>
+                <a:latin typeface="Consolas" panose="020B0609020204030204" pitchFamily="49" charset="0"/>
+              </a:rPr>
+              <a:t> {</a:t>
+            </a:r>
+          </a:p>
+          <a:p>
+            <a:r>
+              <a:rPr lang="da-DK" sz="3200" dirty="0">
+                <a:solidFill>
+                  <a:srgbClr val="000000"/>
+                </a:solidFill>
+                <a:latin typeface="Consolas" panose="020B0609020204030204" pitchFamily="49" charset="0"/>
+              </a:rPr>
+              <a:t>    Green,</a:t>
+            </a:r>
+          </a:p>
+          <a:p>
+            <a:r>
+              <a:rPr lang="da-DK" sz="3200" dirty="0">
+                <a:solidFill>
+                  <a:srgbClr val="000000"/>
+                </a:solidFill>
+                <a:latin typeface="Consolas" panose="020B0609020204030204" pitchFamily="49" charset="0"/>
+              </a:rPr>
+              <a:t>    Red,</a:t>
+            </a:r>
+          </a:p>
+          <a:p>
+            <a:r>
+              <a:rPr lang="da-DK" sz="3200" dirty="0">
+                <a:solidFill>
+                  <a:srgbClr val="000000"/>
+                </a:solidFill>
+                <a:latin typeface="Consolas" panose="020B0609020204030204" pitchFamily="49" charset="0"/>
+              </a:rPr>
+              <a:t>    Yellow</a:t>
+            </a:r>
+          </a:p>
+          <a:p>
+            <a:r>
+              <a:rPr lang="en-DK" sz="3200" dirty="0">
+                <a:solidFill>
+                  <a:srgbClr val="000000"/>
+                </a:solidFill>
+                <a:latin typeface="Consolas" panose="020B0609020204030204" pitchFamily="49" charset="0"/>
+              </a:rPr>
+              <a:t> }</a:t>
+            </a:r>
+            <a:endParaRPr lang="en-DK" sz="3200" dirty="0"/>
+          </a:p>
+        </p:txBody>
+      </p:sp>
+    </p:spTree>
+    <p:extLst>
+      <p:ext uri="{BB962C8B-B14F-4D97-AF65-F5344CB8AC3E}">
+        <p14:creationId xmlns:p14="http://schemas.microsoft.com/office/powerpoint/2010/main" val="1460813641"/>
+      </p:ext>
+    </p:extLst>
+  </p:cSld>
+  <p:clrMapOvr>
+    <a:masterClrMapping/>
+  </p:clrMapOvr>
+  <p:transition>
+    <p:fade/>
+  </p:transition>
+</p:sld>
+</file>
+
+<file path=ppt/slides/slide4.xml><?xml version="1.0" encoding="utf-8"?>
+<p:sld xmlns:a="http://schemas.openxmlformats.org/drawingml/2006/main" xmlns:r="http://schemas.openxmlformats.org/officeDocument/2006/relationships" xmlns:p="http://schemas.openxmlformats.org/presentationml/2006/main">
+  <p:cSld>
+    <p:spTree>
+      <p:nvGrpSpPr>
+        <p:cNvPr id="1" name=""/>
+        <p:cNvGrpSpPr/>
+        <p:nvPr/>
+      </p:nvGrpSpPr>
+      <p:grpSpPr>
+        <a:xfrm>
+          <a:off x="0" y="0"/>
+          <a:ext cx="0" cy="0"/>
+          <a:chOff x="0" y="0"/>
+          <a:chExt cx="0" cy="0"/>
+        </a:xfrm>
+      </p:grpSpPr>
+      <p:sp>
+        <p:nvSpPr>
+          <p:cNvPr id="2" name="Title 1">
+            <a:extLst>
+              <a:ext uri="{FF2B5EF4-FFF2-40B4-BE49-F238E27FC236}">
+                <a16:creationId xmlns:a16="http://schemas.microsoft.com/office/drawing/2014/main" id="{C358F418-0566-459E-AD17-3B1A4801CFF1}"/>
+              </a:ext>
+            </a:extLst>
+          </p:cNvPr>
+          <p:cNvSpPr>
+            <a:spLocks noGrp="1"/>
+          </p:cNvSpPr>
+          <p:nvPr>
+            <p:ph type="title"/>
+          </p:nvPr>
+        </p:nvSpPr>
+        <p:spPr/>
+        <p:txBody>
+          <a:bodyPr/>
+          <a:lstStyle/>
+          <a:p>
+            <a:r>
+              <a:rPr lang="en-US" dirty="0">
+                <a:solidFill>
+                  <a:schemeClr val="tx1"/>
+                </a:solidFill>
+              </a:rPr>
+              <a:t>Enumerations 2/2</a:t>
+            </a:r>
+            <a:endParaRPr lang="en-DK" dirty="0"/>
+          </a:p>
+        </p:txBody>
+      </p:sp>
+      <p:sp>
+        <p:nvSpPr>
+          <p:cNvPr id="4" name="Rectangle 3">
+            <a:extLst>
+              <a:ext uri="{FF2B5EF4-FFF2-40B4-BE49-F238E27FC236}">
+                <a16:creationId xmlns:a16="http://schemas.microsoft.com/office/drawing/2014/main" id="{0918B562-3B8C-41C1-B3CF-22FEAD35C425}"/>
+              </a:ext>
+            </a:extLst>
+          </p:cNvPr>
+          <p:cNvSpPr/>
+          <p:nvPr/>
+        </p:nvSpPr>
+        <p:spPr>
+          <a:xfrm>
+            <a:off x="1645794" y="1650604"/>
+            <a:ext cx="6033388" cy="4893647"/>
+          </a:xfrm>
+          <a:prstGeom prst="rect">
+            <a:avLst/>
+          </a:prstGeom>
+        </p:spPr>
+        <p:txBody>
+          <a:bodyPr wrap="square">
+            <a:spAutoFit/>
+          </a:bodyPr>
+          <a:lstStyle/>
+          <a:p>
+            <a:r>
+              <a:rPr lang="da-DK" sz="2400" dirty="0">
+                <a:solidFill>
+                  <a:srgbClr val="000000"/>
+                </a:solidFill>
+                <a:latin typeface="Consolas" panose="020B0609020204030204" pitchFamily="49" charset="0"/>
+              </a:rPr>
+              <a:t>[Flags]</a:t>
+            </a:r>
+          </a:p>
+          <a:p>
+            <a:r>
+              <a:rPr lang="da-DK" sz="2400" dirty="0">
+                <a:solidFill>
+                  <a:srgbClr val="0000FF"/>
+                </a:solidFill>
+                <a:latin typeface="Consolas" panose="020B0609020204030204" pitchFamily="49" charset="0"/>
+              </a:rPr>
+              <a:t>public</a:t>
+            </a:r>
+            <a:r>
+              <a:rPr lang="da-DK" sz="2400" dirty="0">
+                <a:solidFill>
+                  <a:srgbClr val="000000"/>
+                </a:solidFill>
+                <a:latin typeface="Consolas" panose="020B0609020204030204" pitchFamily="49" charset="0"/>
+              </a:rPr>
+              <a:t> </a:t>
+            </a:r>
+            <a:r>
+              <a:rPr lang="da-DK" sz="2400" dirty="0">
+                <a:solidFill>
+                  <a:srgbClr val="0000FF"/>
+                </a:solidFill>
+                <a:latin typeface="Consolas" panose="020B0609020204030204" pitchFamily="49" charset="0"/>
+              </a:rPr>
+              <a:t>enum</a:t>
+            </a:r>
+            <a:r>
+              <a:rPr lang="da-DK" sz="2400" dirty="0">
+                <a:solidFill>
+                  <a:srgbClr val="000000"/>
+                </a:solidFill>
+                <a:latin typeface="Consolas" panose="020B0609020204030204" pitchFamily="49" charset="0"/>
+              </a:rPr>
+              <a:t> </a:t>
+            </a:r>
+            <a:r>
+              <a:rPr lang="da-DK" sz="2400" dirty="0">
+                <a:solidFill>
+                  <a:srgbClr val="2B91AF"/>
+                </a:solidFill>
+                <a:latin typeface="Consolas" panose="020B0609020204030204" pitchFamily="49" charset="0"/>
+              </a:rPr>
+              <a:t>EightBitSwitches</a:t>
+            </a:r>
+            <a:endParaRPr lang="da-DK" sz="2400" dirty="0">
+              <a:solidFill>
+                <a:srgbClr val="000000"/>
+              </a:solidFill>
+              <a:latin typeface="Consolas" panose="020B0609020204030204" pitchFamily="49" charset="0"/>
+            </a:endParaRPr>
+          </a:p>
+          <a:p>
+            <a:r>
+              <a:rPr lang="en-DK" sz="2400" dirty="0">
+                <a:solidFill>
+                  <a:srgbClr val="000000"/>
+                </a:solidFill>
+                <a:latin typeface="Consolas" panose="020B0609020204030204" pitchFamily="49" charset="0"/>
+              </a:rPr>
+              <a:t>{</a:t>
+            </a:r>
+          </a:p>
+          <a:p>
+            <a:r>
+              <a:rPr lang="da-DK" sz="2400" dirty="0">
+                <a:solidFill>
+                  <a:srgbClr val="000000"/>
+                </a:solidFill>
+                <a:latin typeface="Consolas" panose="020B0609020204030204" pitchFamily="49" charset="0"/>
+              </a:rPr>
+              <a:t>    None  = 0b00000000, </a:t>
+            </a:r>
+            <a:r>
+              <a:rPr lang="da-DK" sz="2400" dirty="0">
+                <a:solidFill>
+                  <a:srgbClr val="008000"/>
+                </a:solidFill>
+                <a:latin typeface="Consolas" panose="020B0609020204030204" pitchFamily="49" charset="0"/>
+              </a:rPr>
+              <a:t>// 0</a:t>
+            </a:r>
+            <a:endParaRPr lang="da-DK" sz="2400" dirty="0">
+              <a:solidFill>
+                <a:srgbClr val="000000"/>
+              </a:solidFill>
+              <a:latin typeface="Consolas" panose="020B0609020204030204" pitchFamily="49" charset="0"/>
+            </a:endParaRPr>
+          </a:p>
+          <a:p>
+            <a:r>
+              <a:rPr lang="da-DK" sz="2400" dirty="0">
+                <a:solidFill>
+                  <a:srgbClr val="000000"/>
+                </a:solidFill>
+                <a:latin typeface="Consolas" panose="020B0609020204030204" pitchFamily="49" charset="0"/>
+              </a:rPr>
+              <a:t>    One   = 0b00000001, </a:t>
+            </a:r>
+            <a:r>
+              <a:rPr lang="da-DK" sz="2400" dirty="0">
+                <a:solidFill>
+                  <a:srgbClr val="008000"/>
+                </a:solidFill>
+                <a:latin typeface="Consolas" panose="020B0609020204030204" pitchFamily="49" charset="0"/>
+              </a:rPr>
+              <a:t>// 1</a:t>
+            </a:r>
+            <a:endParaRPr lang="da-DK" sz="2400" dirty="0">
+              <a:solidFill>
+                <a:srgbClr val="000000"/>
+              </a:solidFill>
+              <a:latin typeface="Consolas" panose="020B0609020204030204" pitchFamily="49" charset="0"/>
+            </a:endParaRPr>
+          </a:p>
+          <a:p>
+            <a:r>
+              <a:rPr lang="da-DK" sz="2400" dirty="0">
+                <a:solidFill>
+                  <a:srgbClr val="000000"/>
+                </a:solidFill>
+                <a:latin typeface="Consolas" panose="020B0609020204030204" pitchFamily="49" charset="0"/>
+              </a:rPr>
+              <a:t>    Two   = 0b00000010, </a:t>
+            </a:r>
+            <a:r>
+              <a:rPr lang="da-DK" sz="2400" dirty="0">
+                <a:solidFill>
+                  <a:srgbClr val="008000"/>
+                </a:solidFill>
+                <a:latin typeface="Consolas" panose="020B0609020204030204" pitchFamily="49" charset="0"/>
+              </a:rPr>
+              <a:t>// 2</a:t>
+            </a:r>
+            <a:endParaRPr lang="da-DK" sz="2400" dirty="0">
+              <a:solidFill>
+                <a:srgbClr val="000000"/>
+              </a:solidFill>
+              <a:latin typeface="Consolas" panose="020B0609020204030204" pitchFamily="49" charset="0"/>
+            </a:endParaRPr>
+          </a:p>
+          <a:p>
+            <a:r>
+              <a:rPr lang="da-DK" sz="2400" dirty="0">
+                <a:solidFill>
+                  <a:srgbClr val="000000"/>
+                </a:solidFill>
+                <a:latin typeface="Consolas" panose="020B0609020204030204" pitchFamily="49" charset="0"/>
+              </a:rPr>
+              <a:t>    Three = 0b00000100, </a:t>
+            </a:r>
+            <a:r>
+              <a:rPr lang="da-DK" sz="2400" dirty="0">
+                <a:solidFill>
+                  <a:srgbClr val="008000"/>
+                </a:solidFill>
+                <a:latin typeface="Consolas" panose="020B0609020204030204" pitchFamily="49" charset="0"/>
+              </a:rPr>
+              <a:t>// 4</a:t>
+            </a:r>
+            <a:endParaRPr lang="da-DK" sz="2400" dirty="0">
+              <a:solidFill>
+                <a:srgbClr val="000000"/>
+              </a:solidFill>
+              <a:latin typeface="Consolas" panose="020B0609020204030204" pitchFamily="49" charset="0"/>
+            </a:endParaRPr>
+          </a:p>
+          <a:p>
+            <a:r>
+              <a:rPr lang="da-DK" sz="2400" dirty="0">
+                <a:solidFill>
+                  <a:srgbClr val="000000"/>
+                </a:solidFill>
+                <a:latin typeface="Consolas" panose="020B0609020204030204" pitchFamily="49" charset="0"/>
+              </a:rPr>
+              <a:t>    Four  = 0b00001000, </a:t>
+            </a:r>
+            <a:r>
+              <a:rPr lang="da-DK" sz="2400" dirty="0">
+                <a:solidFill>
+                  <a:srgbClr val="008000"/>
+                </a:solidFill>
+                <a:latin typeface="Consolas" panose="020B0609020204030204" pitchFamily="49" charset="0"/>
+              </a:rPr>
+              <a:t>// 8</a:t>
+            </a:r>
+            <a:endParaRPr lang="da-DK" sz="2400" dirty="0">
+              <a:solidFill>
+                <a:srgbClr val="000000"/>
+              </a:solidFill>
+              <a:latin typeface="Consolas" panose="020B0609020204030204" pitchFamily="49" charset="0"/>
+            </a:endParaRPr>
+          </a:p>
+          <a:p>
+            <a:r>
+              <a:rPr lang="da-DK" sz="2400" dirty="0">
+                <a:solidFill>
+                  <a:srgbClr val="000000"/>
+                </a:solidFill>
+                <a:latin typeface="Consolas" panose="020B0609020204030204" pitchFamily="49" charset="0"/>
+              </a:rPr>
+              <a:t>    Five  = 0b00010000, </a:t>
+            </a:r>
+            <a:r>
+              <a:rPr lang="da-DK" sz="2400" dirty="0">
+                <a:solidFill>
+                  <a:srgbClr val="008000"/>
+                </a:solidFill>
+                <a:latin typeface="Consolas" panose="020B0609020204030204" pitchFamily="49" charset="0"/>
+              </a:rPr>
+              <a:t>// 16</a:t>
+            </a:r>
+            <a:endParaRPr lang="da-DK" sz="2400" dirty="0">
+              <a:solidFill>
+                <a:srgbClr val="000000"/>
+              </a:solidFill>
+              <a:latin typeface="Consolas" panose="020B0609020204030204" pitchFamily="49" charset="0"/>
+            </a:endParaRPr>
+          </a:p>
+          <a:p>
+            <a:r>
+              <a:rPr lang="da-DK" sz="2400" dirty="0">
+                <a:solidFill>
+                  <a:srgbClr val="000000"/>
+                </a:solidFill>
+                <a:latin typeface="Consolas" panose="020B0609020204030204" pitchFamily="49" charset="0"/>
+              </a:rPr>
+              <a:t>    Six   = 0b00100000, </a:t>
+            </a:r>
+            <a:r>
+              <a:rPr lang="da-DK" sz="2400" dirty="0">
+                <a:solidFill>
+                  <a:srgbClr val="008000"/>
+                </a:solidFill>
+                <a:latin typeface="Consolas" panose="020B0609020204030204" pitchFamily="49" charset="0"/>
+              </a:rPr>
+              <a:t>// 32</a:t>
+            </a:r>
+            <a:endParaRPr lang="da-DK" sz="2400" dirty="0">
+              <a:solidFill>
+                <a:srgbClr val="000000"/>
+              </a:solidFill>
+              <a:latin typeface="Consolas" panose="020B0609020204030204" pitchFamily="49" charset="0"/>
+            </a:endParaRPr>
+          </a:p>
+          <a:p>
+            <a:r>
+              <a:rPr lang="da-DK" sz="2400" dirty="0">
+                <a:solidFill>
+                  <a:srgbClr val="000000"/>
+                </a:solidFill>
+                <a:latin typeface="Consolas" panose="020B0609020204030204" pitchFamily="49" charset="0"/>
+              </a:rPr>
+              <a:t>    Seven = 0b01000000, </a:t>
+            </a:r>
+            <a:r>
+              <a:rPr lang="da-DK" sz="2400" dirty="0">
+                <a:solidFill>
+                  <a:srgbClr val="008000"/>
+                </a:solidFill>
+                <a:latin typeface="Consolas" panose="020B0609020204030204" pitchFamily="49" charset="0"/>
+              </a:rPr>
+              <a:t>// 64</a:t>
+            </a:r>
+            <a:endParaRPr lang="da-DK" sz="2400" dirty="0">
+              <a:solidFill>
+                <a:srgbClr val="000000"/>
+              </a:solidFill>
+              <a:latin typeface="Consolas" panose="020B0609020204030204" pitchFamily="49" charset="0"/>
+            </a:endParaRPr>
+          </a:p>
+          <a:p>
+            <a:r>
+              <a:rPr lang="da-DK" sz="2400" dirty="0">
+                <a:solidFill>
+                  <a:srgbClr val="000000"/>
+                </a:solidFill>
+                <a:latin typeface="Consolas" panose="020B0609020204030204" pitchFamily="49" charset="0"/>
+              </a:rPr>
+              <a:t>    Eight = 0b10000000  </a:t>
+            </a:r>
+            <a:r>
+              <a:rPr lang="da-DK" sz="2400" dirty="0">
+                <a:solidFill>
+                  <a:srgbClr val="008000"/>
+                </a:solidFill>
+                <a:latin typeface="Consolas" panose="020B0609020204030204" pitchFamily="49" charset="0"/>
+              </a:rPr>
+              <a:t>// 128</a:t>
+            </a:r>
+            <a:endParaRPr lang="da-DK" sz="2400" dirty="0">
+              <a:solidFill>
+                <a:srgbClr val="000000"/>
+              </a:solidFill>
+              <a:latin typeface="Consolas" panose="020B0609020204030204" pitchFamily="49" charset="0"/>
+            </a:endParaRPr>
+          </a:p>
+          <a:p>
+            <a:r>
+              <a:rPr lang="en-DK" sz="2400" dirty="0">
+                <a:solidFill>
+                  <a:srgbClr val="000000"/>
+                </a:solidFill>
+                <a:latin typeface="Consolas" panose="020B0609020204030204" pitchFamily="49" charset="0"/>
+              </a:rPr>
+              <a:t>}</a:t>
+            </a:r>
+            <a:endParaRPr lang="en-DK" sz="2400" dirty="0"/>
+          </a:p>
+        </p:txBody>
+      </p:sp>
+    </p:spTree>
+    <p:extLst>
+      <p:ext uri="{BB962C8B-B14F-4D97-AF65-F5344CB8AC3E}">
+        <p14:creationId xmlns:p14="http://schemas.microsoft.com/office/powerpoint/2010/main" val="370779400"/>
+      </p:ext>
+    </p:extLst>
+  </p:cSld>
+  <p:clrMapOvr>
+    <a:masterClrMapping/>
+  </p:clrMapOvr>
+  <p:transition>
+    <p:fade/>
+  </p:transition>
+</p:sld>
+</file>
+
+<file path=ppt/slides/slide5.xml><?xml version="1.0" encoding="utf-8"?>
 <p:sld xmlns:a="http://schemas.openxmlformats.org/drawingml/2006/main" xmlns:r="http://schemas.openxmlformats.org/officeDocument/2006/relationships" xmlns:p="http://schemas.openxmlformats.org/presentationml/2006/main">
   <p:cSld>
     <p:bg>
@@ -5011,7 +5751,7 @@
 </p:sld>
 </file>
 
-<file path=ppt/slides/slide4.xml><?xml version="1.0" encoding="utf-8"?>
+<file path=ppt/slides/slide6.xml><?xml version="1.0" encoding="utf-8"?>
 <p:sld xmlns:a="http://schemas.openxmlformats.org/drawingml/2006/main" xmlns:r="http://schemas.openxmlformats.org/officeDocument/2006/relationships" xmlns:p="http://schemas.openxmlformats.org/presentationml/2006/main">
   <p:cSld>
     <p:bg>
@@ -5123,7 +5863,7 @@
 </p:sld>
 </file>
 
-<file path=ppt/slides/slide5.xml><?xml version="1.0" encoding="utf-8"?>
+<file path=ppt/slides/slide7.xml><?xml version="1.0" encoding="utf-8"?>
 <p:sld xmlns:a="http://schemas.openxmlformats.org/drawingml/2006/main" xmlns:r="http://schemas.openxmlformats.org/officeDocument/2006/relationships" xmlns:p="http://schemas.openxmlformats.org/presentationml/2006/main">
   <p:cSld>
     <p:bg>
@@ -5235,7 +5975,7 @@
 </p:sld>
 </file>
 
-<file path=ppt/slides/slide6.xml><?xml version="1.0" encoding="utf-8"?>
+<file path=ppt/slides/slide8.xml><?xml version="1.0" encoding="utf-8"?>
 <p:sld xmlns:a="http://schemas.openxmlformats.org/drawingml/2006/main" xmlns:r="http://schemas.openxmlformats.org/officeDocument/2006/relationships" xmlns:p="http://schemas.openxmlformats.org/presentationml/2006/main">
   <p:cSld>
     <p:bg>
@@ -5330,7 +6070,7 @@
 </p:sld>
 </file>
 
-<file path=ppt/slides/slide7.xml><?xml version="1.0" encoding="utf-8"?>
+<file path=ppt/slides/slide9.xml><?xml version="1.0" encoding="utf-8"?>
 <p:sld xmlns:a="http://schemas.openxmlformats.org/drawingml/2006/main" xmlns:r="http://schemas.openxmlformats.org/officeDocument/2006/relationships" xmlns:p="http://schemas.openxmlformats.org/presentationml/2006/main">
   <p:cSld>
     <p:bg>
@@ -5430,118 +6170,6 @@
     <p:extLst>
       <p:ext uri="{BB962C8B-B14F-4D97-AF65-F5344CB8AC3E}">
         <p14:creationId xmlns:p14="http://schemas.microsoft.com/office/powerpoint/2010/main" val="2599729435"/>
-      </p:ext>
-    </p:extLst>
-  </p:cSld>
-  <p:clrMapOvr>
-    <a:masterClrMapping/>
-  </p:clrMapOvr>
-  <p:transition>
-    <p:fade/>
-  </p:transition>
-</p:sld>
-</file>
-
-<file path=ppt/slides/slide8.xml><?xml version="1.0" encoding="utf-8"?>
-<p:sld xmlns:a="http://schemas.openxmlformats.org/drawingml/2006/main" xmlns:r="http://schemas.openxmlformats.org/officeDocument/2006/relationships" xmlns:p="http://schemas.openxmlformats.org/presentationml/2006/main">
-  <p:cSld>
-    <p:bg>
-      <p:bgPr>
-        <a:solidFill>
-          <a:srgbClr val="00188F"/>
-        </a:solidFill>
-        <a:effectLst/>
-      </p:bgPr>
-    </p:bg>
-    <p:spTree>
-      <p:nvGrpSpPr>
-        <p:cNvPr id="1" name=""/>
-        <p:cNvGrpSpPr/>
-        <p:nvPr/>
-      </p:nvGrpSpPr>
-      <p:grpSpPr>
-        <a:xfrm>
-          <a:off x="0" y="0"/>
-          <a:ext cx="0" cy="0"/>
-          <a:chOff x="0" y="0"/>
-          <a:chExt cx="0" cy="0"/>
-        </a:xfrm>
-      </p:grpSpPr>
-      <p:sp>
-        <p:nvSpPr>
-          <p:cNvPr id="2" name="Title 1">
-            <a:extLst>
-              <a:ext uri="{FF2B5EF4-FFF2-40B4-BE49-F238E27FC236}">
-                <a16:creationId xmlns:a16="http://schemas.microsoft.com/office/drawing/2014/main" id="{DACBDE14-6E24-4435-99D0-DCA6EBAA14E8}"/>
-              </a:ext>
-            </a:extLst>
-          </p:cNvPr>
-          <p:cNvSpPr>
-            <a:spLocks noGrp="1"/>
-          </p:cNvSpPr>
-          <p:nvPr>
-            <p:ph type="title"/>
-          </p:nvPr>
-        </p:nvSpPr>
-        <p:spPr/>
-        <p:txBody>
-          <a:bodyPr/>
-          <a:lstStyle/>
-          <a:p>
-            <a:r>
-              <a:rPr lang="da-DK" dirty="0">
-                <a:solidFill>
-                  <a:schemeClr val="bg1"/>
-                </a:solidFill>
-              </a:rPr>
-              <a:t>Linq</a:t>
-            </a:r>
-            <a:endParaRPr lang="en-DK" dirty="0">
-              <a:solidFill>
-                <a:schemeClr val="bg1"/>
-              </a:solidFill>
-            </a:endParaRPr>
-          </a:p>
-        </p:txBody>
-      </p:sp>
-      <p:sp>
-        <p:nvSpPr>
-          <p:cNvPr id="3" name="Text Placeholder 2">
-            <a:extLst>
-              <a:ext uri="{FF2B5EF4-FFF2-40B4-BE49-F238E27FC236}">
-                <a16:creationId xmlns:a16="http://schemas.microsoft.com/office/drawing/2014/main" id="{9F0CF441-10E2-4402-8E81-4B2DA9307069}"/>
-              </a:ext>
-            </a:extLst>
-          </p:cNvPr>
-          <p:cNvSpPr>
-            <a:spLocks noGrp="1"/>
-          </p:cNvSpPr>
-          <p:nvPr>
-            <p:ph type="body" sz="quarter" idx="10"/>
-          </p:nvPr>
-        </p:nvSpPr>
-        <p:spPr>
-          <a:xfrm>
-            <a:off x="274209" y="1212850"/>
-            <a:ext cx="8778240" cy="683264"/>
-          </a:xfrm>
-        </p:spPr>
-        <p:txBody>
-          <a:bodyPr/>
-          <a:lstStyle/>
-          <a:p>
-            <a:endParaRPr lang="en-DK">
-              <a:solidFill>
-                <a:schemeClr val="bg1"/>
-              </a:solidFill>
-            </a:endParaRPr>
-          </a:p>
-        </p:txBody>
-      </p:sp>
-    </p:spTree>
-    <p:extLst>
-      <p:ext uri="{BB962C8B-B14F-4D97-AF65-F5344CB8AC3E}">
-        <p14:creationId xmlns:p14="http://schemas.microsoft.com/office/powerpoint/2010/main" val="1654522918"/>
       </p:ext>
     </p:extLst>
   </p:cSld>
@@ -6415,70 +7043,6 @@
 </file>
 
 <file path=customXml/item1.xml><?xml version="1.0" encoding="utf-8"?>
-<p:properties xmlns:p="http://schemas.microsoft.com/office/2006/metadata/properties" xmlns:xsi="http://www.w3.org/2001/XMLSchema-instance" xmlns:pc="http://schemas.microsoft.com/office/infopath/2007/PartnerControls">
-  <documentManagement>
-    <TrackTaxHTField0 xmlns="2295e2e7-0eeb-498e-8716-217bb2ee6ee3">
-      <Terms xmlns="http://schemas.microsoft.com/office/infopath/2007/PartnerControls"/>
-    </TrackTaxHTField0>
-    <CampaignTaxHTField0 xmlns="2295e2e7-0eeb-498e-8716-217bb2ee6ee3">
-      <Terms xmlns="http://schemas.microsoft.com/office/infopath/2007/PartnerControls"/>
-    </CampaignTaxHTField0>
-    <Event_x0020_End_x0020_Date xmlns="2295e2e7-0eeb-498e-8716-217bb2ee6ee3" xsi:nil="true"/>
-    <Event_x0020_Start_x0020_Date xmlns="2295e2e7-0eeb-498e-8716-217bb2ee6ee3" xsi:nil="true"/>
-    <MS_x0020_Speaker xmlns="2295e2e7-0eeb-498e-8716-217bb2ee6ee3">
-      <UserInfo>
-        <DisplayName/>
-        <AccountId xsi:nil="true"/>
-        <AccountType/>
-      </UserInfo>
-    </MS_x0020_Speaker>
-    <External_x0020_Speaker xmlns="2295e2e7-0eeb-498e-8716-217bb2ee6ee3" xsi:nil="true"/>
-    <Session_x0020_Code xmlns="2295e2e7-0eeb-498e-8716-217bb2ee6ee3" xsi:nil="true"/>
-    <ProductTaxHTField0 xmlns="2295e2e7-0eeb-498e-8716-217bb2ee6ee3">
-      <Terms xmlns="http://schemas.microsoft.com/office/infopath/2007/PartnerControls"/>
-    </ProductTaxHTField0>
-    <Presentation_x0020_Date xmlns="2295e2e7-0eeb-498e-8716-217bb2ee6ee3" xsi:nil="true"/>
-    <Event_x0020_LocationTaxHTField0 xmlns="2295e2e7-0eeb-498e-8716-217bb2ee6ee3">
-      <Terms xmlns="http://schemas.microsoft.com/office/infopath/2007/PartnerControls"/>
-    </Event_x0020_LocationTaxHTField0>
-    <Event1TaxHTField0 xmlns="2295e2e7-0eeb-498e-8716-217bb2ee6ee3">
-      <Terms xmlns="http://schemas.microsoft.com/office/infopath/2007/PartnerControls">
-        <TermInfo xmlns="http://schemas.microsoft.com/office/infopath/2007/PartnerControls">
-          <TermName xmlns="http://schemas.microsoft.com/office/infopath/2007/PartnerControls">Unassigned</TermName>
-          <TermId xmlns="http://schemas.microsoft.com/office/infopath/2007/PartnerControls">e51362f4-782c-41a8-bb7b-e0cfc8669933</TermId>
-        </TermInfo>
-      </Terms>
-    </Event1TaxHTField0>
-    <AudienceTaxHTField0 xmlns="8b529f77-48ab-4581-b468-93f09345b8aa">
-      <Terms xmlns="http://schemas.microsoft.com/office/infopath/2007/PartnerControls"/>
-    </AudienceTaxHTField0>
-    <MS_x0020_Content_x0020_Owner xmlns="2295e2e7-0eeb-498e-8716-217bb2ee6ee3">
-      <UserInfo>
-        <DisplayName/>
-        <AccountId xsi:nil="true"/>
-        <AccountType/>
-      </UserInfo>
-    </MS_x0020_Content_x0020_Owner>
-    <TaxCatchAll xmlns="2295e2e7-0eeb-498e-8716-217bb2ee6ee3">
-      <Value>217</Value>
-    </TaxCatchAll>
-    <Event_x0020_VenueTaxHTField0 xmlns="2295e2e7-0eeb-498e-8716-217bb2ee6ee3">
-      <Terms xmlns="http://schemas.microsoft.com/office/infopath/2007/PartnerControls"/>
-    </Event_x0020_VenueTaxHTField0>
-  </documentManagement>
-</p:properties>
-</file>
-
-<file path=customXml/item2.xml><?xml version="1.0" encoding="utf-8"?>
-<?mso-contentType ?>
-<FormTemplates xmlns="http://schemas.microsoft.com/sharepoint/v3/contenttype/forms">
-  <Display>DocumentLibraryForm</Display>
-  <Edit>DocumentLibraryForm</Edit>
-  <New>DocumentLibraryForm</New>
-</FormTemplates>
-</file>
-
-<file path=customXml/item3.xml><?xml version="1.0" encoding="utf-8"?>
 <ct:contentTypeSchema xmlns:ct="http://schemas.microsoft.com/office/2006/metadata/contentType" xmlns:ma="http://schemas.microsoft.com/office/2006/metadata/properties/metaAttributes" ct:_="" ma:_="" ma:contentTypeName="PresentationsDoc" ma:contentTypeID="0x010100B88FC3ECA26D1C46B3C4C83281D2EB9C003BBE479AF4108146A616B6B5E7069DBC" ma:contentTypeVersion="61" ma:contentTypeDescription="" ma:contentTypeScope="" ma:versionID="72533711bacf991a4680f48ae6b725f9">
   <xsd:schema xmlns:xsd="http://www.w3.org/2001/XMLSchema" xmlns:xs="http://www.w3.org/2001/XMLSchema" xmlns:p="http://schemas.microsoft.com/office/2006/metadata/properties" xmlns:ns2="2295e2e7-0eeb-498e-8716-217bb2ee6ee3" xmlns:ns3="8b529f77-48ab-4581-b468-93f09345b8aa" targetNamespace="http://schemas.microsoft.com/office/2006/metadata/properties" ma:root="true" ma:fieldsID="dde17010d50e6e632f300eac8dfd378e" ns2:_="" ns3:_="">
     <xsd:import namespace="2295e2e7-0eeb-498e-8716-217bb2ee6ee3"/>
@@ -6757,32 +7321,71 @@
 </ct:contentTypeSchema>
 </file>
 
-<file path=customXml/itemProps1.xml><?xml version="1.0" encoding="utf-8"?>
-<ds:datastoreItem xmlns:ds="http://schemas.openxmlformats.org/officeDocument/2006/customXml" ds:itemID="{F990F116-B58F-4255-B05B-DA3808E0E5C6}">
-  <ds:schemaRefs>
-    <ds:schemaRef ds:uri="http://schemas.microsoft.com/office/2006/documentManagement/types"/>
-    <ds:schemaRef ds:uri="http://purl.org/dc/dcmitype/"/>
-    <ds:schemaRef ds:uri="http://schemas.openxmlformats.org/package/2006/metadata/core-properties"/>
-    <ds:schemaRef ds:uri="http://purl.org/dc/elements/1.1/"/>
-    <ds:schemaRef ds:uri="http://schemas.microsoft.com/office/2006/metadata/properties"/>
-    <ds:schemaRef ds:uri="http://schemas.microsoft.com/office/infopath/2007/PartnerControls"/>
-    <ds:schemaRef ds:uri="8b529f77-48ab-4581-b468-93f09345b8aa"/>
-    <ds:schemaRef ds:uri="2295e2e7-0eeb-498e-8716-217bb2ee6ee3"/>
-    <ds:schemaRef ds:uri="http://www.w3.org/XML/1998/namespace"/>
-    <ds:schemaRef ds:uri="http://purl.org/dc/terms/"/>
-  </ds:schemaRefs>
-</ds:datastoreItem>
+<file path=customXml/item2.xml><?xml version="1.0" encoding="utf-8"?>
+<?mso-contentType ?>
+<FormTemplates xmlns="http://schemas.microsoft.com/sharepoint/v3/contenttype/forms">
+  <Display>DocumentLibraryForm</Display>
+  <Edit>DocumentLibraryForm</Edit>
+  <New>DocumentLibraryForm</New>
+</FormTemplates>
 </file>
 
-<file path=customXml/itemProps2.xml><?xml version="1.0" encoding="utf-8"?>
-<ds:datastoreItem xmlns:ds="http://schemas.openxmlformats.org/officeDocument/2006/customXml" ds:itemID="{758FDAC0-319D-4A54-8D8E-1D42CB1F8004}">
-  <ds:schemaRefs>
-    <ds:schemaRef ds:uri="http://schemas.microsoft.com/sharepoint/v3/contenttype/forms"/>
-  </ds:schemaRefs>
-</ds:datastoreItem>
+<file path=customXml/item3.xml><?xml version="1.0" encoding="utf-8"?>
+<p:properties xmlns:p="http://schemas.microsoft.com/office/2006/metadata/properties" xmlns:xsi="http://www.w3.org/2001/XMLSchema-instance" xmlns:pc="http://schemas.microsoft.com/office/infopath/2007/PartnerControls">
+  <documentManagement>
+    <TrackTaxHTField0 xmlns="2295e2e7-0eeb-498e-8716-217bb2ee6ee3">
+      <Terms xmlns="http://schemas.microsoft.com/office/infopath/2007/PartnerControls"/>
+    </TrackTaxHTField0>
+    <CampaignTaxHTField0 xmlns="2295e2e7-0eeb-498e-8716-217bb2ee6ee3">
+      <Terms xmlns="http://schemas.microsoft.com/office/infopath/2007/PartnerControls"/>
+    </CampaignTaxHTField0>
+    <Event_x0020_End_x0020_Date xmlns="2295e2e7-0eeb-498e-8716-217bb2ee6ee3" xsi:nil="true"/>
+    <Event_x0020_Start_x0020_Date xmlns="2295e2e7-0eeb-498e-8716-217bb2ee6ee3" xsi:nil="true"/>
+    <MS_x0020_Speaker xmlns="2295e2e7-0eeb-498e-8716-217bb2ee6ee3">
+      <UserInfo>
+        <DisplayName/>
+        <AccountId xsi:nil="true"/>
+        <AccountType/>
+      </UserInfo>
+    </MS_x0020_Speaker>
+    <External_x0020_Speaker xmlns="2295e2e7-0eeb-498e-8716-217bb2ee6ee3" xsi:nil="true"/>
+    <Session_x0020_Code xmlns="2295e2e7-0eeb-498e-8716-217bb2ee6ee3" xsi:nil="true"/>
+    <ProductTaxHTField0 xmlns="2295e2e7-0eeb-498e-8716-217bb2ee6ee3">
+      <Terms xmlns="http://schemas.microsoft.com/office/infopath/2007/PartnerControls"/>
+    </ProductTaxHTField0>
+    <Presentation_x0020_Date xmlns="2295e2e7-0eeb-498e-8716-217bb2ee6ee3" xsi:nil="true"/>
+    <Event_x0020_LocationTaxHTField0 xmlns="2295e2e7-0eeb-498e-8716-217bb2ee6ee3">
+      <Terms xmlns="http://schemas.microsoft.com/office/infopath/2007/PartnerControls"/>
+    </Event_x0020_LocationTaxHTField0>
+    <Event1TaxHTField0 xmlns="2295e2e7-0eeb-498e-8716-217bb2ee6ee3">
+      <Terms xmlns="http://schemas.microsoft.com/office/infopath/2007/PartnerControls">
+        <TermInfo xmlns="http://schemas.microsoft.com/office/infopath/2007/PartnerControls">
+          <TermName xmlns="http://schemas.microsoft.com/office/infopath/2007/PartnerControls">Unassigned</TermName>
+          <TermId xmlns="http://schemas.microsoft.com/office/infopath/2007/PartnerControls">e51362f4-782c-41a8-bb7b-e0cfc8669933</TermId>
+        </TermInfo>
+      </Terms>
+    </Event1TaxHTField0>
+    <AudienceTaxHTField0 xmlns="8b529f77-48ab-4581-b468-93f09345b8aa">
+      <Terms xmlns="http://schemas.microsoft.com/office/infopath/2007/PartnerControls"/>
+    </AudienceTaxHTField0>
+    <MS_x0020_Content_x0020_Owner xmlns="2295e2e7-0eeb-498e-8716-217bb2ee6ee3">
+      <UserInfo>
+        <DisplayName/>
+        <AccountId xsi:nil="true"/>
+        <AccountType/>
+      </UserInfo>
+    </MS_x0020_Content_x0020_Owner>
+    <TaxCatchAll xmlns="2295e2e7-0eeb-498e-8716-217bb2ee6ee3">
+      <Value>217</Value>
+    </TaxCatchAll>
+    <Event_x0020_VenueTaxHTField0 xmlns="2295e2e7-0eeb-498e-8716-217bb2ee6ee3">
+      <Terms xmlns="http://schemas.microsoft.com/office/infopath/2007/PartnerControls"/>
+    </Event_x0020_VenueTaxHTField0>
+  </documentManagement>
+</p:properties>
 </file>
 
-<file path=customXml/itemProps3.xml><?xml version="1.0" encoding="utf-8"?>
+<file path=customXml/itemProps1.xml><?xml version="1.0" encoding="utf-8"?>
 <ds:datastoreItem xmlns:ds="http://schemas.openxmlformats.org/officeDocument/2006/customXml" ds:itemID="{A4A71FB1-3FB8-468F-9C64-2246CB74C7D9}">
   <ds:schemaRefs>
     <ds:schemaRef ds:uri="http://schemas.microsoft.com/office/2006/metadata/contentType"/>
@@ -6799,4 +7402,29 @@
     <ds:schemaRef ds:uri="http://schemas.microsoft.com/internal/obd"/>
   </ds:schemaRefs>
 </ds:datastoreItem>
+</file>
+
+<file path=customXml/itemProps2.xml><?xml version="1.0" encoding="utf-8"?>
+<ds:datastoreItem xmlns:ds="http://schemas.openxmlformats.org/officeDocument/2006/customXml" ds:itemID="{758FDAC0-319D-4A54-8D8E-1D42CB1F8004}">
+  <ds:schemaRefs>
+    <ds:schemaRef ds:uri="http://schemas.microsoft.com/sharepoint/v3/contenttype/forms"/>
+  </ds:schemaRefs>
+</ds:datastoreItem>
+</file>
+
+<file path=customXml/itemProps3.xml><?xml version="1.0" encoding="utf-8"?>
+<ds:datastoreItem xmlns:ds="http://schemas.openxmlformats.org/officeDocument/2006/customXml" ds:itemID="{F990F116-B58F-4255-B05B-DA3808E0E5C6}">
+  <ds:schemaRefs>
+    <ds:schemaRef ds:uri="http://schemas.microsoft.com/office/2006/documentManagement/types"/>
+    <ds:schemaRef ds:uri="http://purl.org/dc/dcmitype/"/>
+    <ds:schemaRef ds:uri="http://schemas.openxmlformats.org/package/2006/metadata/core-properties"/>
+    <ds:schemaRef ds:uri="http://purl.org/dc/elements/1.1/"/>
+    <ds:schemaRef ds:uri="http://schemas.microsoft.com/office/2006/metadata/properties"/>
+    <ds:schemaRef ds:uri="http://schemas.microsoft.com/office/infopath/2007/PartnerControls"/>
+    <ds:schemaRef ds:uri="8b529f77-48ab-4581-b468-93f09345b8aa"/>
+    <ds:schemaRef ds:uri="2295e2e7-0eeb-498e-8716-217bb2ee6ee3"/>
+    <ds:schemaRef ds:uri="http://www.w3.org/XML/1998/namespace"/>
+    <ds:schemaRef ds:uri="http://purl.org/dc/terms/"/>
+  </ds:schemaRefs>
+</ds:datastoreItem>
 </file>
</xml_diff>